<commit_message>
NSH2 plot with 0.01 threshold
</commit_message>
<xml_diff>
--- a/outputs/figures/20231122_MSH2_Beta_Fuse.pptx
+++ b/outputs/figures/20231122_MSH2_Beta_Fuse.pptx
@@ -5,7 +5,7 @@
     <p:sldMasterId id="2147483648" r:id="rId1"/>
   </p:sldMasterIdLst>
   <p:sldIdLst>
-    <p:sldId id="256" r:id="rId6"/>
+    <p:sldId id="257" r:id="rId2"/>
   </p:sldIdLst>
   <p:sldSz cx="10698163" cy="7562850"/>
   <p:notesSz cx="6858000" cy="9144000"/>
@@ -104,6 +104,22 @@
       </a:defRPr>
     </a:lvl9pPr>
   </p:defaultTextStyle>
+  <p:extLst>
+    <p:ext uri="{EFAFB233-063F-42B5-8137-9DF3F51BA10A}">
+      <p15:sldGuideLst xmlns:p15="http://schemas.microsoft.com/office/powerpoint/2012/main">
+        <p15:guide id="1" orient="horz" pos="2382">
+          <p15:clr>
+            <a:srgbClr val="A4A3A4"/>
+          </p15:clr>
+        </p15:guide>
+        <p15:guide id="2" pos="3370">
+          <p15:clr>
+            <a:srgbClr val="A4A3A4"/>
+          </p15:clr>
+        </p15:guide>
+      </p15:sldGuideLst>
+    </p:ext>
+  </p:extLst>
 </p:presentation>
 </file>
 
@@ -145,7 +161,7 @@
           <a:lstStyle/>
           <a:p>
             <a:r>
-              <a:rPr lang="en-US" smtClean="0"/>
+              <a:rPr lang="en-US"/>
               <a:t>Click to edit Master title style</a:t>
             </a:r>
             <a:endParaRPr lang="en-GB"/>
@@ -264,7 +280,7 @@
           </a:lstStyle>
           <a:p>
             <a:r>
-              <a:rPr lang="en-US" smtClean="0"/>
+              <a:rPr lang="en-US"/>
               <a:t>Click to edit Master subtitle style</a:t>
             </a:r>
             <a:endParaRPr lang="en-GB"/>
@@ -288,7 +304,7 @@
           <a:p>
             <a:fld id="{6BA5D40C-A8DC-479A-A5D3-E7B4936A184B}" type="datetimeFigureOut">
               <a:rPr lang="en-GB" smtClean="0"/>
-              <a:t>15/07/2015</a:t>
+              <a:t>22/11/2023</a:t>
             </a:fld>
             <a:endParaRPr lang="en-GB"/>
           </a:p>
@@ -382,7 +398,7 @@
           <a:lstStyle/>
           <a:p>
             <a:r>
-              <a:rPr lang="en-US" smtClean="0"/>
+              <a:rPr lang="en-US"/>
               <a:t>Click to edit Master title style</a:t>
             </a:r>
             <a:endParaRPr lang="en-GB"/>
@@ -406,35 +422,35 @@
           <a:p>
             <a:pPr lvl="0"/>
             <a:r>
-              <a:rPr lang="en-US" smtClean="0"/>
+              <a:rPr lang="en-US"/>
               <a:t>Click to edit Master text styles</a:t>
             </a:r>
           </a:p>
           <a:p>
             <a:pPr lvl="1"/>
             <a:r>
-              <a:rPr lang="en-US" smtClean="0"/>
+              <a:rPr lang="en-US"/>
               <a:t>Second level</a:t>
             </a:r>
           </a:p>
           <a:p>
             <a:pPr lvl="2"/>
             <a:r>
-              <a:rPr lang="en-US" smtClean="0"/>
+              <a:rPr lang="en-US"/>
               <a:t>Third level</a:t>
             </a:r>
           </a:p>
           <a:p>
             <a:pPr lvl="3"/>
             <a:r>
-              <a:rPr lang="en-US" smtClean="0"/>
+              <a:rPr lang="en-US"/>
               <a:t>Fourth level</a:t>
             </a:r>
           </a:p>
           <a:p>
             <a:pPr lvl="4"/>
             <a:r>
-              <a:rPr lang="en-US" smtClean="0"/>
+              <a:rPr lang="en-US"/>
               <a:t>Fifth level</a:t>
             </a:r>
             <a:endParaRPr lang="en-GB"/>
@@ -458,7 +474,7 @@
           <a:p>
             <a:fld id="{6BA5D40C-A8DC-479A-A5D3-E7B4936A184B}" type="datetimeFigureOut">
               <a:rPr lang="en-GB" smtClean="0"/>
-              <a:t>15/07/2015</a:t>
+              <a:t>22/11/2023</a:t>
             </a:fld>
             <a:endParaRPr lang="en-GB"/>
           </a:p>
@@ -557,7 +573,7 @@
           <a:lstStyle/>
           <a:p>
             <a:r>
-              <a:rPr lang="en-US" smtClean="0"/>
+              <a:rPr lang="en-US"/>
               <a:t>Click to edit Master title style</a:t>
             </a:r>
             <a:endParaRPr lang="en-GB"/>
@@ -586,35 +602,35 @@
           <a:p>
             <a:pPr lvl="0"/>
             <a:r>
-              <a:rPr lang="en-US" smtClean="0"/>
+              <a:rPr lang="en-US"/>
               <a:t>Click to edit Master text styles</a:t>
             </a:r>
           </a:p>
           <a:p>
             <a:pPr lvl="1"/>
             <a:r>
-              <a:rPr lang="en-US" smtClean="0"/>
+              <a:rPr lang="en-US"/>
               <a:t>Second level</a:t>
             </a:r>
           </a:p>
           <a:p>
             <a:pPr lvl="2"/>
             <a:r>
-              <a:rPr lang="en-US" smtClean="0"/>
+              <a:rPr lang="en-US"/>
               <a:t>Third level</a:t>
             </a:r>
           </a:p>
           <a:p>
             <a:pPr lvl="3"/>
             <a:r>
-              <a:rPr lang="en-US" smtClean="0"/>
+              <a:rPr lang="en-US"/>
               <a:t>Fourth level</a:t>
             </a:r>
           </a:p>
           <a:p>
             <a:pPr lvl="4"/>
             <a:r>
-              <a:rPr lang="en-US" smtClean="0"/>
+              <a:rPr lang="en-US"/>
               <a:t>Fifth level</a:t>
             </a:r>
             <a:endParaRPr lang="en-GB"/>
@@ -638,7 +654,7 @@
           <a:p>
             <a:fld id="{6BA5D40C-A8DC-479A-A5D3-E7B4936A184B}" type="datetimeFigureOut">
               <a:rPr lang="en-GB" smtClean="0"/>
-              <a:t>15/07/2015</a:t>
+              <a:t>22/11/2023</a:t>
             </a:fld>
             <a:endParaRPr lang="en-GB"/>
           </a:p>
@@ -732,7 +748,7 @@
           <a:lstStyle/>
           <a:p>
             <a:r>
-              <a:rPr lang="en-US" smtClean="0"/>
+              <a:rPr lang="en-US"/>
               <a:t>Click to edit Master title style</a:t>
             </a:r>
             <a:endParaRPr lang="en-GB"/>
@@ -756,35 +772,35 @@
           <a:p>
             <a:pPr lvl="0"/>
             <a:r>
-              <a:rPr lang="en-US" smtClean="0"/>
+              <a:rPr lang="en-US"/>
               <a:t>Click to edit Master text styles</a:t>
             </a:r>
           </a:p>
           <a:p>
             <a:pPr lvl="1"/>
             <a:r>
-              <a:rPr lang="en-US" smtClean="0"/>
+              <a:rPr lang="en-US"/>
               <a:t>Second level</a:t>
             </a:r>
           </a:p>
           <a:p>
             <a:pPr lvl="2"/>
             <a:r>
-              <a:rPr lang="en-US" smtClean="0"/>
+              <a:rPr lang="en-US"/>
               <a:t>Third level</a:t>
             </a:r>
           </a:p>
           <a:p>
             <a:pPr lvl="3"/>
             <a:r>
-              <a:rPr lang="en-US" smtClean="0"/>
+              <a:rPr lang="en-US"/>
               <a:t>Fourth level</a:t>
             </a:r>
           </a:p>
           <a:p>
             <a:pPr lvl="4"/>
             <a:r>
-              <a:rPr lang="en-US" smtClean="0"/>
+              <a:rPr lang="en-US"/>
               <a:t>Fifth level</a:t>
             </a:r>
             <a:endParaRPr lang="en-GB"/>
@@ -808,7 +824,7 @@
           <a:p>
             <a:fld id="{6BA5D40C-A8DC-479A-A5D3-E7B4936A184B}" type="datetimeFigureOut">
               <a:rPr lang="en-GB" smtClean="0"/>
-              <a:t>15/07/2015</a:t>
+              <a:t>22/11/2023</a:t>
             </a:fld>
             <a:endParaRPr lang="en-GB"/>
           </a:p>
@@ -911,7 +927,7 @@
           </a:lstStyle>
           <a:p>
             <a:r>
-              <a:rPr lang="en-US" smtClean="0"/>
+              <a:rPr lang="en-US"/>
               <a:t>Click to edit Master title style</a:t>
             </a:r>
             <a:endParaRPr lang="en-GB"/>
@@ -1031,7 +1047,7 @@
           <a:p>
             <a:pPr lvl="0"/>
             <a:r>
-              <a:rPr lang="en-US" smtClean="0"/>
+              <a:rPr lang="en-US"/>
               <a:t>Click to edit Master text styles</a:t>
             </a:r>
           </a:p>
@@ -1054,7 +1070,7 @@
           <a:p>
             <a:fld id="{6BA5D40C-A8DC-479A-A5D3-E7B4936A184B}" type="datetimeFigureOut">
               <a:rPr lang="en-GB" smtClean="0"/>
-              <a:t>15/07/2015</a:t>
+              <a:t>22/11/2023</a:t>
             </a:fld>
             <a:endParaRPr lang="en-GB"/>
           </a:p>
@@ -1148,7 +1164,7 @@
           <a:lstStyle/>
           <a:p>
             <a:r>
-              <a:rPr lang="en-US" smtClean="0"/>
+              <a:rPr lang="en-US"/>
               <a:t>Click to edit Master title style</a:t>
             </a:r>
             <a:endParaRPr lang="en-GB"/>
@@ -1205,35 +1221,35 @@
           <a:p>
             <a:pPr lvl="0"/>
             <a:r>
-              <a:rPr lang="en-US" smtClean="0"/>
+              <a:rPr lang="en-US"/>
               <a:t>Click to edit Master text styles</a:t>
             </a:r>
           </a:p>
           <a:p>
             <a:pPr lvl="1"/>
             <a:r>
-              <a:rPr lang="en-US" smtClean="0"/>
+              <a:rPr lang="en-US"/>
               <a:t>Second level</a:t>
             </a:r>
           </a:p>
           <a:p>
             <a:pPr lvl="2"/>
             <a:r>
-              <a:rPr lang="en-US" smtClean="0"/>
+              <a:rPr lang="en-US"/>
               <a:t>Third level</a:t>
             </a:r>
           </a:p>
           <a:p>
             <a:pPr lvl="3"/>
             <a:r>
-              <a:rPr lang="en-US" smtClean="0"/>
+              <a:rPr lang="en-US"/>
               <a:t>Fourth level</a:t>
             </a:r>
           </a:p>
           <a:p>
             <a:pPr lvl="4"/>
             <a:r>
-              <a:rPr lang="en-US" smtClean="0"/>
+              <a:rPr lang="en-US"/>
               <a:t>Fifth level</a:t>
             </a:r>
             <a:endParaRPr lang="en-GB"/>
@@ -1290,35 +1306,35 @@
           <a:p>
             <a:pPr lvl="0"/>
             <a:r>
-              <a:rPr lang="en-US" smtClean="0"/>
+              <a:rPr lang="en-US"/>
               <a:t>Click to edit Master text styles</a:t>
             </a:r>
           </a:p>
           <a:p>
             <a:pPr lvl="1"/>
             <a:r>
-              <a:rPr lang="en-US" smtClean="0"/>
+              <a:rPr lang="en-US"/>
               <a:t>Second level</a:t>
             </a:r>
           </a:p>
           <a:p>
             <a:pPr lvl="2"/>
             <a:r>
-              <a:rPr lang="en-US" smtClean="0"/>
+              <a:rPr lang="en-US"/>
               <a:t>Third level</a:t>
             </a:r>
           </a:p>
           <a:p>
             <a:pPr lvl="3"/>
             <a:r>
-              <a:rPr lang="en-US" smtClean="0"/>
+              <a:rPr lang="en-US"/>
               <a:t>Fourth level</a:t>
             </a:r>
           </a:p>
           <a:p>
             <a:pPr lvl="4"/>
             <a:r>
-              <a:rPr lang="en-US" smtClean="0"/>
+              <a:rPr lang="en-US"/>
               <a:t>Fifth level</a:t>
             </a:r>
             <a:endParaRPr lang="en-GB"/>
@@ -1342,7 +1358,7 @@
           <a:p>
             <a:fld id="{6BA5D40C-A8DC-479A-A5D3-E7B4936A184B}" type="datetimeFigureOut">
               <a:rPr lang="en-GB" smtClean="0"/>
-              <a:t>15/07/2015</a:t>
+              <a:t>22/11/2023</a:t>
             </a:fld>
             <a:endParaRPr lang="en-GB"/>
           </a:p>
@@ -1445,7 +1461,7 @@
           </a:lstStyle>
           <a:p>
             <a:r>
-              <a:rPr lang="en-US" smtClean="0"/>
+              <a:rPr lang="en-US"/>
               <a:t>Click to edit Master title style</a:t>
             </a:r>
             <a:endParaRPr lang="en-GB"/>
@@ -1511,7 +1527,7 @@
           <a:p>
             <a:pPr lvl="0"/>
             <a:r>
-              <a:rPr lang="en-US" smtClean="0"/>
+              <a:rPr lang="en-US"/>
               <a:t>Click to edit Master text styles</a:t>
             </a:r>
           </a:p>
@@ -1567,35 +1583,35 @@
           <a:p>
             <a:pPr lvl="0"/>
             <a:r>
-              <a:rPr lang="en-US" smtClean="0"/>
+              <a:rPr lang="en-US"/>
               <a:t>Click to edit Master text styles</a:t>
             </a:r>
           </a:p>
           <a:p>
             <a:pPr lvl="1"/>
             <a:r>
-              <a:rPr lang="en-US" smtClean="0"/>
+              <a:rPr lang="en-US"/>
               <a:t>Second level</a:t>
             </a:r>
           </a:p>
           <a:p>
             <a:pPr lvl="2"/>
             <a:r>
-              <a:rPr lang="en-US" smtClean="0"/>
+              <a:rPr lang="en-US"/>
               <a:t>Third level</a:t>
             </a:r>
           </a:p>
           <a:p>
             <a:pPr lvl="3"/>
             <a:r>
-              <a:rPr lang="en-US" smtClean="0"/>
+              <a:rPr lang="en-US"/>
               <a:t>Fourth level</a:t>
             </a:r>
           </a:p>
           <a:p>
             <a:pPr lvl="4"/>
             <a:r>
-              <a:rPr lang="en-US" smtClean="0"/>
+              <a:rPr lang="en-US"/>
               <a:t>Fifth level</a:t>
             </a:r>
             <a:endParaRPr lang="en-GB"/>
@@ -1661,7 +1677,7 @@
           <a:p>
             <a:pPr lvl="0"/>
             <a:r>
-              <a:rPr lang="en-US" smtClean="0"/>
+              <a:rPr lang="en-US"/>
               <a:t>Click to edit Master text styles</a:t>
             </a:r>
           </a:p>
@@ -1717,35 +1733,35 @@
           <a:p>
             <a:pPr lvl="0"/>
             <a:r>
-              <a:rPr lang="en-US" smtClean="0"/>
+              <a:rPr lang="en-US"/>
               <a:t>Click to edit Master text styles</a:t>
             </a:r>
           </a:p>
           <a:p>
             <a:pPr lvl="1"/>
             <a:r>
-              <a:rPr lang="en-US" smtClean="0"/>
+              <a:rPr lang="en-US"/>
               <a:t>Second level</a:t>
             </a:r>
           </a:p>
           <a:p>
             <a:pPr lvl="2"/>
             <a:r>
-              <a:rPr lang="en-US" smtClean="0"/>
+              <a:rPr lang="en-US"/>
               <a:t>Third level</a:t>
             </a:r>
           </a:p>
           <a:p>
             <a:pPr lvl="3"/>
             <a:r>
-              <a:rPr lang="en-US" smtClean="0"/>
+              <a:rPr lang="en-US"/>
               <a:t>Fourth level</a:t>
             </a:r>
           </a:p>
           <a:p>
             <a:pPr lvl="4"/>
             <a:r>
-              <a:rPr lang="en-US" smtClean="0"/>
+              <a:rPr lang="en-US"/>
               <a:t>Fifth level</a:t>
             </a:r>
             <a:endParaRPr lang="en-GB"/>
@@ -1769,7 +1785,7 @@
           <a:p>
             <a:fld id="{6BA5D40C-A8DC-479A-A5D3-E7B4936A184B}" type="datetimeFigureOut">
               <a:rPr lang="en-GB" smtClean="0"/>
-              <a:t>15/07/2015</a:t>
+              <a:t>22/11/2023</a:t>
             </a:fld>
             <a:endParaRPr lang="en-GB"/>
           </a:p>
@@ -1863,7 +1879,7 @@
           <a:lstStyle/>
           <a:p>
             <a:r>
-              <a:rPr lang="en-US" smtClean="0"/>
+              <a:rPr lang="en-US"/>
               <a:t>Click to edit Master title style</a:t>
             </a:r>
             <a:endParaRPr lang="en-GB"/>
@@ -1887,7 +1903,7 @@
           <a:p>
             <a:fld id="{6BA5D40C-A8DC-479A-A5D3-E7B4936A184B}" type="datetimeFigureOut">
               <a:rPr lang="en-GB" smtClean="0"/>
-              <a:t>15/07/2015</a:t>
+              <a:t>22/11/2023</a:t>
             </a:fld>
             <a:endParaRPr lang="en-GB"/>
           </a:p>
@@ -1982,7 +1998,7 @@
           <a:p>
             <a:fld id="{6BA5D40C-A8DC-479A-A5D3-E7B4936A184B}" type="datetimeFigureOut">
               <a:rPr lang="en-GB" smtClean="0"/>
-              <a:t>15/07/2015</a:t>
+              <a:t>22/11/2023</a:t>
             </a:fld>
             <a:endParaRPr lang="en-GB"/>
           </a:p>
@@ -2085,7 +2101,7 @@
           </a:lstStyle>
           <a:p>
             <a:r>
-              <a:rPr lang="en-US" smtClean="0"/>
+              <a:rPr lang="en-US"/>
               <a:t>Click to edit Master title style</a:t>
             </a:r>
             <a:endParaRPr lang="en-GB"/>
@@ -2142,35 +2158,35 @@
           <a:p>
             <a:pPr lvl="0"/>
             <a:r>
-              <a:rPr lang="en-US" smtClean="0"/>
+              <a:rPr lang="en-US"/>
               <a:t>Click to edit Master text styles</a:t>
             </a:r>
           </a:p>
           <a:p>
             <a:pPr lvl="1"/>
             <a:r>
-              <a:rPr lang="en-US" smtClean="0"/>
+              <a:rPr lang="en-US"/>
               <a:t>Second level</a:t>
             </a:r>
           </a:p>
           <a:p>
             <a:pPr lvl="2"/>
             <a:r>
-              <a:rPr lang="en-US" smtClean="0"/>
+              <a:rPr lang="en-US"/>
               <a:t>Third level</a:t>
             </a:r>
           </a:p>
           <a:p>
             <a:pPr lvl="3"/>
             <a:r>
-              <a:rPr lang="en-US" smtClean="0"/>
+              <a:rPr lang="en-US"/>
               <a:t>Fourth level</a:t>
             </a:r>
           </a:p>
           <a:p>
             <a:pPr lvl="4"/>
             <a:r>
-              <a:rPr lang="en-US" smtClean="0"/>
+              <a:rPr lang="en-US"/>
               <a:t>Fifth level</a:t>
             </a:r>
             <a:endParaRPr lang="en-GB"/>
@@ -2236,7 +2252,7 @@
           <a:p>
             <a:pPr lvl="0"/>
             <a:r>
-              <a:rPr lang="en-US" smtClean="0"/>
+              <a:rPr lang="en-US"/>
               <a:t>Click to edit Master text styles</a:t>
             </a:r>
           </a:p>
@@ -2259,7 +2275,7 @@
           <a:p>
             <a:fld id="{6BA5D40C-A8DC-479A-A5D3-E7B4936A184B}" type="datetimeFigureOut">
               <a:rPr lang="en-GB" smtClean="0"/>
-              <a:t>15/07/2015</a:t>
+              <a:t>22/11/2023</a:t>
             </a:fld>
             <a:endParaRPr lang="en-GB"/>
           </a:p>
@@ -2362,7 +2378,7 @@
           </a:lstStyle>
           <a:p>
             <a:r>
-              <a:rPr lang="en-US" smtClean="0"/>
+              <a:rPr lang="en-US"/>
               <a:t>Click to edit Master title style</a:t>
             </a:r>
             <a:endParaRPr lang="en-GB"/>
@@ -2489,7 +2505,7 @@
           <a:p>
             <a:pPr lvl="0"/>
             <a:r>
-              <a:rPr lang="en-US" smtClean="0"/>
+              <a:rPr lang="en-US"/>
               <a:t>Click to edit Master text styles</a:t>
             </a:r>
           </a:p>
@@ -2512,7 +2528,7 @@
           <a:p>
             <a:fld id="{6BA5D40C-A8DC-479A-A5D3-E7B4936A184B}" type="datetimeFigureOut">
               <a:rPr lang="en-GB" smtClean="0"/>
-              <a:t>15/07/2015</a:t>
+              <a:t>22/11/2023</a:t>
             </a:fld>
             <a:endParaRPr lang="en-GB"/>
           </a:p>
@@ -2621,7 +2637,7 @@
           <a:lstStyle/>
           <a:p>
             <a:r>
-              <a:rPr lang="en-US" smtClean="0"/>
+              <a:rPr lang="en-US"/>
               <a:t>Click to edit Master title style</a:t>
             </a:r>
             <a:endParaRPr lang="en-GB"/>
@@ -2655,35 +2671,35 @@
           <a:p>
             <a:pPr lvl="0"/>
             <a:r>
-              <a:rPr lang="en-US" smtClean="0"/>
+              <a:rPr lang="en-US"/>
               <a:t>Click to edit Master text styles</a:t>
             </a:r>
           </a:p>
           <a:p>
             <a:pPr lvl="1"/>
             <a:r>
-              <a:rPr lang="en-US" smtClean="0"/>
+              <a:rPr lang="en-US"/>
               <a:t>Second level</a:t>
             </a:r>
           </a:p>
           <a:p>
             <a:pPr lvl="2"/>
             <a:r>
-              <a:rPr lang="en-US" smtClean="0"/>
+              <a:rPr lang="en-US"/>
               <a:t>Third level</a:t>
             </a:r>
           </a:p>
           <a:p>
             <a:pPr lvl="3"/>
             <a:r>
-              <a:rPr lang="en-US" smtClean="0"/>
+              <a:rPr lang="en-US"/>
               <a:t>Fourth level</a:t>
             </a:r>
           </a:p>
           <a:p>
             <a:pPr lvl="4"/>
             <a:r>
-              <a:rPr lang="en-US" smtClean="0"/>
+              <a:rPr lang="en-US"/>
               <a:t>Fifth level</a:t>
             </a:r>
             <a:endParaRPr lang="en-GB"/>
@@ -2725,7 +2741,7 @@
           <a:p>
             <a:fld id="{6BA5D40C-A8DC-479A-A5D3-E7B4936A184B}" type="datetimeFigureOut">
               <a:rPr lang="en-GB" smtClean="0"/>
-              <a:t>15/07/2015</a:t>
+              <a:t>22/11/2023</a:t>
             </a:fld>
             <a:endParaRPr lang="en-GB"/>
           </a:p>
@@ -3100,9 +3116,9 @@
           <a:chExt cx="0" cy="0"/>
         </a:xfrm>
       </p:grpSpPr>
-      <p:grpSp xmlns:pic="http://schemas.openxmlformats.org/drawingml/2006/picture">
+      <p:grpSp>
         <p:nvGrpSpPr>
-          <p:cNvPr id="2" name=""/>
+          <p:cNvPr id="2" name="Group 1"/>
           <p:cNvGrpSpPr/>
           <p:nvPr/>
         </p:nvGrpSpPr>
@@ -3146,7 +3162,9 @@
           <p:txBody>
             <a:bodyPr/>
             <a:lstStyle/>
-            <a:p/>
+            <a:p>
+              <a:endParaRPr/>
+            </a:p>
           </p:txBody>
         </p:sp>
         <p:sp>
@@ -3181,7 +3199,9 @@
           <p:txBody>
             <a:bodyPr/>
             <a:lstStyle/>
-            <a:p/>
+            <a:p>
+              <a:endParaRPr/>
+            </a:p>
           </p:txBody>
         </p:sp>
         <p:sp>
@@ -3192,8 +3212,8 @@
           </p:nvSpPr>
           <p:spPr>
             <a:xfrm>
-              <a:off x="3420934" y="3972814"/>
-              <a:ext cx="225432" cy="225432"/>
+              <a:off x="3422805" y="3974685"/>
+              <a:ext cx="221689" cy="221689"/>
             </a:xfrm>
             <a:prstGeom prst="ellipse">
               <a:avLst/>
@@ -3216,7 +3236,9 @@
           <p:txBody>
             <a:bodyPr/>
             <a:lstStyle/>
-            <a:p/>
+            <a:p>
+              <a:endParaRPr/>
+            </a:p>
           </p:txBody>
         </p:sp>
         <p:sp>
@@ -3227,8 +3249,8 @@
           </p:nvSpPr>
           <p:spPr>
             <a:xfrm>
-              <a:off x="3173054" y="2295980"/>
-              <a:ext cx="178189" cy="178189"/>
+              <a:off x="3175565" y="2298491"/>
+              <a:ext cx="173167" cy="173167"/>
             </a:xfrm>
             <a:prstGeom prst="ellipse">
               <a:avLst/>
@@ -3251,7 +3273,9 @@
           <p:txBody>
             <a:bodyPr/>
             <a:lstStyle/>
-            <a:p/>
+            <a:p>
+              <a:endParaRPr/>
+            </a:p>
           </p:txBody>
         </p:sp>
         <p:sp>
@@ -3262,8 +3286,8 @@
           </p:nvSpPr>
           <p:spPr>
             <a:xfrm>
-              <a:off x="4425862" y="3197862"/>
-              <a:ext cx="111714" cy="111714"/>
+              <a:off x="4424101" y="3196101"/>
+              <a:ext cx="115236" cy="115236"/>
             </a:xfrm>
             <a:prstGeom prst="ellipse">
               <a:avLst/>
@@ -3286,7 +3310,9 @@
           <p:txBody>
             <a:bodyPr/>
             <a:lstStyle/>
-            <a:p/>
+            <a:p>
+              <a:endParaRPr/>
+            </a:p>
           </p:txBody>
         </p:sp>
         <p:sp>
@@ -3297,8 +3323,8 @@
           </p:nvSpPr>
           <p:spPr>
             <a:xfrm>
-              <a:off x="4393297" y="3197862"/>
-              <a:ext cx="111714" cy="111714"/>
+              <a:off x="4391536" y="3196101"/>
+              <a:ext cx="115236" cy="115236"/>
             </a:xfrm>
             <a:prstGeom prst="ellipse">
               <a:avLst/>
@@ -3321,7 +3347,9 @@
           <p:txBody>
             <a:bodyPr/>
             <a:lstStyle/>
-            <a:p/>
+            <a:p>
+              <a:endParaRPr/>
+            </a:p>
           </p:txBody>
         </p:sp>
         <p:sp>
@@ -3332,8 +3360,8 @@
           </p:nvSpPr>
           <p:spPr>
             <a:xfrm>
-              <a:off x="5242406" y="3381299"/>
-              <a:ext cx="88720" cy="88720"/>
+              <a:off x="5240737" y="3379630"/>
+              <a:ext cx="92058" cy="92058"/>
             </a:xfrm>
             <a:prstGeom prst="ellipse">
               <a:avLst/>
@@ -3356,7 +3384,9 @@
           <p:txBody>
             <a:bodyPr/>
             <a:lstStyle/>
-            <a:p/>
+            <a:p>
+              <a:endParaRPr/>
+            </a:p>
           </p:txBody>
         </p:sp>
         <p:sp>
@@ -3367,8 +3397,8 @@
           </p:nvSpPr>
           <p:spPr>
             <a:xfrm>
-              <a:off x="4201412" y="3449945"/>
-              <a:ext cx="77111" cy="77111"/>
+              <a:off x="4193939" y="3442472"/>
+              <a:ext cx="92058" cy="92058"/>
             </a:xfrm>
             <a:prstGeom prst="ellipse">
               <a:avLst/>
@@ -3391,7 +3421,9 @@
           <p:txBody>
             <a:bodyPr/>
             <a:lstStyle/>
-            <a:p/>
+            <a:p>
+              <a:endParaRPr/>
+            </a:p>
           </p:txBody>
         </p:sp>
         <p:sp>
@@ -3402,8 +3434,8 @@
           </p:nvSpPr>
           <p:spPr>
             <a:xfrm>
-              <a:off x="4267409" y="3587000"/>
-              <a:ext cx="69510" cy="69510"/>
+              <a:off x="4284114" y="3603705"/>
+              <a:ext cx="36101" cy="36101"/>
             </a:xfrm>
             <a:prstGeom prst="ellipse">
               <a:avLst/>
@@ -3426,7 +3458,9 @@
           <p:txBody>
             <a:bodyPr/>
             <a:lstStyle/>
-            <a:p/>
+            <a:p>
+              <a:endParaRPr/>
+            </a:p>
           </p:txBody>
         </p:sp>
         <p:sp>
@@ -3437,8 +3471,8 @@
           </p:nvSpPr>
           <p:spPr>
             <a:xfrm>
-              <a:off x="5220553" y="3557028"/>
-              <a:ext cx="45683" cy="45683"/>
+              <a:off x="5225344" y="3561820"/>
+              <a:ext cx="36101" cy="36101"/>
             </a:xfrm>
             <a:prstGeom prst="ellipse">
               <a:avLst/>
@@ -3461,7 +3495,9 @@
           <p:txBody>
             <a:bodyPr/>
             <a:lstStyle/>
-            <a:p/>
+            <a:p>
+              <a:endParaRPr/>
+            </a:p>
           </p:txBody>
         </p:sp>
         <p:sp>
@@ -3496,7 +3532,9 @@
           <p:txBody>
             <a:bodyPr/>
             <a:lstStyle/>
-            <a:p/>
+            <a:p>
+              <a:endParaRPr/>
+            </a:p>
           </p:txBody>
         </p:sp>
         <p:sp>
@@ -3507,18 +3545,22 @@
           </p:nvSpPr>
           <p:spPr>
             <a:xfrm>
-              <a:off x="4271779" y="3186262"/>
-              <a:ext cx="164267" cy="62471"/>
+              <a:off x="4287065" y="3187080"/>
+              <a:ext cx="149118" cy="61306"/>
             </a:xfrm>
             <a:custGeom>
               <a:avLst/>
+              <a:gdLst/>
+              <a:ahLst/>
+              <a:cxnLst/>
+              <a:rect l="0" t="0" r="0" b="0"/>
               <a:pathLst>
-                <a:path w="164267" h="62471">
+                <a:path w="149118" h="61306">
                   <a:moveTo>
                     <a:pt x="0" y="0"/>
                   </a:moveTo>
                   <a:lnTo>
-                    <a:pt x="164267" y="62471"/>
+                    <a:pt x="149118" y="61306"/>
                   </a:lnTo>
                 </a:path>
               </a:pathLst>
@@ -3536,7 +3578,9 @@
           <p:txBody>
             <a:bodyPr/>
             <a:lstStyle/>
-            <a:p/>
+            <a:p>
+              <a:endParaRPr/>
+            </a:p>
           </p:txBody>
         </p:sp>
         <p:sp>
@@ -3547,7 +3591,7 @@
           </p:nvSpPr>
           <p:spPr>
             <a:xfrm>
-              <a:off x="4893541" y="4946660"/>
+              <a:off x="4892584" y="4947089"/>
               <a:ext cx="666874" cy="106781"/>
             </a:xfrm>
             <a:prstGeom prst="rect">
@@ -3556,10 +3600,10 @@
             <a:noFill/>
           </p:spPr>
           <p:txBody>
-            <a:bodyPr lIns="0" rIns="0" tIns="0" bIns="0" anchorCtr="1" anchor="ctr" wrap="none"/>
-            <a:lstStyle/>
-            <a:p>
-              <a:pPr algn="l" marL="0" marR="0" indent="0">
+            <a:bodyPr wrap="none" lIns="0" tIns="0" rIns="0" bIns="0" anchor="ctr" anchorCtr="1"/>
+            <a:lstStyle/>
+            <a:p>
+              <a:pPr marL="0" marR="0" indent="0" algn="l">
                 <a:lnSpc>
                   <a:spcPts val="1138"/>
                 </a:lnSpc>
@@ -3593,7 +3637,7 @@
           </p:nvSpPr>
           <p:spPr>
             <a:xfrm>
-              <a:off x="3304054" y="3889469"/>
+              <a:off x="3303150" y="3890354"/>
               <a:ext cx="682895" cy="135647"/>
             </a:xfrm>
             <a:prstGeom prst="rect">
@@ -3602,10 +3646,10 @@
             <a:noFill/>
           </p:spPr>
           <p:txBody>
-            <a:bodyPr lIns="0" rIns="0" tIns="0" bIns="0" anchorCtr="1" anchor="ctr" wrap="none"/>
-            <a:lstStyle/>
-            <a:p>
-              <a:pPr algn="l" marL="0" marR="0" indent="0">
+            <a:bodyPr wrap="none" lIns="0" tIns="0" rIns="0" bIns="0" anchor="ctr" anchorCtr="1"/>
+            <a:lstStyle/>
+            <a:p>
+              <a:pPr marL="0" marR="0" indent="0" algn="l">
                 <a:lnSpc>
                   <a:spcPts val="1138"/>
                 </a:lnSpc>
@@ -3639,7 +3683,7 @@
           </p:nvSpPr>
           <p:spPr>
             <a:xfrm>
-              <a:off x="2796624" y="2442972"/>
+              <a:off x="3020049" y="2218367"/>
               <a:ext cx="707243" cy="106428"/>
             </a:xfrm>
             <a:prstGeom prst="rect">
@@ -3648,10 +3692,10 @@
             <a:noFill/>
           </p:spPr>
           <p:txBody>
-            <a:bodyPr lIns="0" rIns="0" tIns="0" bIns="0" anchorCtr="1" anchor="ctr" wrap="none"/>
-            <a:lstStyle/>
-            <a:p>
-              <a:pPr algn="l" marL="0" marR="0" indent="0">
+            <a:bodyPr wrap="none" lIns="0" tIns="0" rIns="0" bIns="0" anchor="ctr" anchorCtr="1"/>
+            <a:lstStyle/>
+            <a:p>
+              <a:pPr marL="0" marR="0" indent="0" algn="l">
                 <a:lnSpc>
                   <a:spcPts val="1138"/>
                 </a:lnSpc>
@@ -3685,7 +3729,7 @@
           </p:nvSpPr>
           <p:spPr>
             <a:xfrm>
-              <a:off x="4340373" y="3086276"/>
+              <a:off x="4355290" y="3086900"/>
               <a:ext cx="682895" cy="106781"/>
             </a:xfrm>
             <a:prstGeom prst="rect">
@@ -3694,10 +3738,10 @@
             <a:noFill/>
           </p:spPr>
           <p:txBody>
-            <a:bodyPr lIns="0" rIns="0" tIns="0" bIns="0" anchorCtr="1" anchor="ctr" wrap="none"/>
-            <a:lstStyle/>
-            <a:p>
-              <a:pPr algn="l" marL="0" marR="0" indent="0">
+            <a:bodyPr wrap="none" lIns="0" tIns="0" rIns="0" bIns="0" anchor="ctr" anchorCtr="1"/>
+            <a:lstStyle/>
+            <a:p>
+              <a:pPr marL="0" marR="0" indent="0" algn="l">
                 <a:lnSpc>
                   <a:spcPts val="1138"/>
                 </a:lnSpc>
@@ -3731,7 +3775,7 @@
           </p:nvSpPr>
           <p:spPr>
             <a:xfrm>
-              <a:off x="3589949" y="3126235"/>
+              <a:off x="3605235" y="3126078"/>
               <a:ext cx="658969" cy="106428"/>
             </a:xfrm>
             <a:prstGeom prst="rect">
@@ -3740,10 +3784,10 @@
             <a:noFill/>
           </p:spPr>
           <p:txBody>
-            <a:bodyPr lIns="0" rIns="0" tIns="0" bIns="0" anchorCtr="1" anchor="ctr" wrap="none"/>
-            <a:lstStyle/>
-            <a:p>
-              <a:pPr algn="l" marL="0" marR="0" indent="0">
+            <a:bodyPr wrap="none" lIns="0" tIns="0" rIns="0" bIns="0" anchor="ctr" anchorCtr="1"/>
+            <a:lstStyle/>
+            <a:p>
+              <a:pPr marL="0" marR="0" indent="0" algn="l">
                 <a:lnSpc>
                   <a:spcPts val="1138"/>
                 </a:lnSpc>
@@ -3777,7 +3821,7 @@
           </p:nvSpPr>
           <p:spPr>
             <a:xfrm>
-              <a:off x="5114755" y="3256101"/>
+              <a:off x="5130016" y="3256703"/>
               <a:ext cx="602508" cy="109534"/>
             </a:xfrm>
             <a:prstGeom prst="rect">
@@ -3786,10 +3830,10 @@
             <a:noFill/>
           </p:spPr>
           <p:txBody>
-            <a:bodyPr lIns="0" rIns="0" tIns="0" bIns="0" anchorCtr="1" anchor="ctr" wrap="none"/>
-            <a:lstStyle/>
-            <a:p>
-              <a:pPr algn="l" marL="0" marR="0" indent="0">
+            <a:bodyPr wrap="none" lIns="0" tIns="0" rIns="0" bIns="0" anchor="ctr" anchorCtr="1"/>
+            <a:lstStyle/>
+            <a:p>
+              <a:pPr marL="0" marR="0" indent="0" algn="l">
                 <a:lnSpc>
                   <a:spcPts val="1138"/>
                 </a:lnSpc>
@@ -3823,7 +3867,7 @@
           </p:nvSpPr>
           <p:spPr>
             <a:xfrm>
-              <a:off x="3776005" y="3293336"/>
+              <a:off x="3774673" y="3292700"/>
               <a:ext cx="707032" cy="135647"/>
             </a:xfrm>
             <a:prstGeom prst="rect">
@@ -3832,10 +3876,10 @@
             <a:noFill/>
           </p:spPr>
           <p:txBody>
-            <a:bodyPr lIns="0" rIns="0" tIns="0" bIns="0" anchorCtr="1" anchor="ctr" wrap="none"/>
-            <a:lstStyle/>
-            <a:p>
-              <a:pPr algn="l" marL="0" marR="0" indent="0">
+            <a:bodyPr wrap="none" lIns="0" tIns="0" rIns="0" bIns="0" anchor="ctr" anchorCtr="1"/>
+            <a:lstStyle/>
+            <a:p>
+              <a:pPr marL="0" marR="0" indent="0" algn="l">
                 <a:lnSpc>
                   <a:spcPts val="1138"/>
                 </a:lnSpc>
@@ -3869,7 +3913,7 @@
           </p:nvSpPr>
           <p:spPr>
             <a:xfrm>
-              <a:off x="4071594" y="3650464"/>
+              <a:off x="4072251" y="3650613"/>
               <a:ext cx="682895" cy="134659"/>
             </a:xfrm>
             <a:prstGeom prst="rect">
@@ -3878,10 +3922,10 @@
             <a:noFill/>
           </p:spPr>
           <p:txBody>
-            <a:bodyPr lIns="0" rIns="0" tIns="0" bIns="0" anchorCtr="1" anchor="ctr" wrap="none"/>
-            <a:lstStyle/>
-            <a:p>
-              <a:pPr algn="l" marL="0" marR="0" indent="0">
+            <a:bodyPr wrap="none" lIns="0" tIns="0" rIns="0" bIns="0" anchor="ctr" anchorCtr="1"/>
+            <a:lstStyle/>
+            <a:p>
+              <a:pPr marL="0" marR="0" indent="0" algn="l">
                 <a:lnSpc>
                   <a:spcPts val="1138"/>
                 </a:lnSpc>
@@ -3915,7 +3959,7 @@
           </p:nvSpPr>
           <p:spPr>
             <a:xfrm>
-              <a:off x="5304515" y="3479470"/>
+              <a:off x="5302590" y="3479663"/>
               <a:ext cx="674849" cy="109393"/>
             </a:xfrm>
             <a:prstGeom prst="rect">
@@ -3924,10 +3968,10 @@
             <a:noFill/>
           </p:spPr>
           <p:txBody>
-            <a:bodyPr lIns="0" rIns="0" tIns="0" bIns="0" anchorCtr="1" anchor="ctr" wrap="none"/>
-            <a:lstStyle/>
-            <a:p>
-              <a:pPr algn="l" marL="0" marR="0" indent="0">
+            <a:bodyPr wrap="none" lIns="0" tIns="0" rIns="0" bIns="0" anchor="ctr" anchorCtr="1"/>
+            <a:lstStyle/>
+            <a:p>
+              <a:pPr marL="0" marR="0" indent="0" algn="l">
                 <a:lnSpc>
                   <a:spcPts val="1138"/>
                 </a:lnSpc>
@@ -3961,7 +4005,7 @@
           </p:nvSpPr>
           <p:spPr>
             <a:xfrm>
-              <a:off x="4846453" y="3674082"/>
+              <a:off x="4846928" y="3674112"/>
               <a:ext cx="634762" cy="109534"/>
             </a:xfrm>
             <a:prstGeom prst="rect">
@@ -3970,10 +4014,10 @@
             <a:noFill/>
           </p:spPr>
           <p:txBody>
-            <a:bodyPr lIns="0" rIns="0" tIns="0" bIns="0" anchorCtr="1" anchor="ctr" wrap="none"/>
-            <a:lstStyle/>
-            <a:p>
-              <a:pPr algn="l" marL="0" marR="0" indent="0">
+            <a:bodyPr wrap="none" lIns="0" tIns="0" rIns="0" bIns="0" anchor="ctr" anchorCtr="1"/>
+            <a:lstStyle/>
+            <a:p>
+              <a:pPr marL="0" marR="0" indent="0" algn="l">
                 <a:lnSpc>
                   <a:spcPts val="1138"/>
                 </a:lnSpc>
@@ -4012,8 +4056,12 @@
             </a:xfrm>
             <a:custGeom>
               <a:avLst/>
+              <a:gdLst/>
+              <a:ahLst/>
+              <a:cxnLst/>
+              <a:rect l="0" t="0" r="0" b="0"/>
               <a:pathLst>
-                <a:path w="0" h="3630074">
+                <a:path h="3630074">
                   <a:moveTo>
                     <a:pt x="0" y="3630074"/>
                   </a:moveTo>
@@ -4036,7 +4084,9 @@
           <p:txBody>
             <a:bodyPr/>
             <a:lstStyle/>
-            <a:p/>
+            <a:p>
+              <a:endParaRPr/>
+            </a:p>
           </p:txBody>
         </p:sp>
         <p:sp>
@@ -4056,10 +4106,10 @@
             <a:noFill/>
           </p:spPr>
           <p:txBody>
-            <a:bodyPr lIns="0" rIns="0" tIns="0" bIns="0" anchorCtr="1" anchor="ctr" wrap="none"/>
-            <a:lstStyle/>
-            <a:p>
-              <a:pPr algn="l" marL="0" marR="0" indent="0">
+            <a:bodyPr wrap="none" lIns="0" tIns="0" rIns="0" bIns="0" anchor="ctr" anchorCtr="1"/>
+            <a:lstStyle/>
+            <a:p>
+              <a:pPr marL="0" marR="0" indent="0" algn="l">
                 <a:lnSpc>
                   <a:spcPts val="1200"/>
                 </a:lnSpc>
@@ -4102,10 +4152,10 @@
             <a:noFill/>
           </p:spPr>
           <p:txBody>
-            <a:bodyPr lIns="0" rIns="0" tIns="0" bIns="0" anchorCtr="1" anchor="ctr" wrap="none"/>
-            <a:lstStyle/>
-            <a:p>
-              <a:pPr algn="l" marL="0" marR="0" indent="0">
+            <a:bodyPr wrap="none" lIns="0" tIns="0" rIns="0" bIns="0" anchor="ctr" anchorCtr="1"/>
+            <a:lstStyle/>
+            <a:p>
+              <a:pPr marL="0" marR="0" indent="0" algn="l">
                 <a:lnSpc>
                   <a:spcPts val="1200"/>
                 </a:lnSpc>
@@ -4148,10 +4198,10 @@
             <a:noFill/>
           </p:spPr>
           <p:txBody>
-            <a:bodyPr lIns="0" rIns="0" tIns="0" bIns="0" anchorCtr="1" anchor="ctr" wrap="none"/>
-            <a:lstStyle/>
-            <a:p>
-              <a:pPr algn="l" marL="0" marR="0" indent="0">
+            <a:bodyPr wrap="none" lIns="0" tIns="0" rIns="0" bIns="0" anchor="ctr" anchorCtr="1"/>
+            <a:lstStyle/>
+            <a:p>
+              <a:pPr marL="0" marR="0" indent="0" algn="l">
                 <a:lnSpc>
                   <a:spcPts val="1200"/>
                 </a:lnSpc>
@@ -4194,10 +4244,10 @@
             <a:noFill/>
           </p:spPr>
           <p:txBody>
-            <a:bodyPr lIns="0" rIns="0" tIns="0" bIns="0" anchorCtr="1" anchor="ctr" wrap="none"/>
-            <a:lstStyle/>
-            <a:p>
-              <a:pPr algn="l" marL="0" marR="0" indent="0">
+            <a:bodyPr wrap="none" lIns="0" tIns="0" rIns="0" bIns="0" anchor="ctr" anchorCtr="1"/>
+            <a:lstStyle/>
+            <a:p>
+              <a:pPr marL="0" marR="0" indent="0" algn="l">
                 <a:lnSpc>
                   <a:spcPts val="1200"/>
                 </a:lnSpc>
@@ -4236,8 +4286,12 @@
             </a:xfrm>
             <a:custGeom>
               <a:avLst/>
+              <a:gdLst/>
+              <a:ahLst/>
+              <a:cxnLst/>
+              <a:rect l="0" t="0" r="0" b="0"/>
               <a:pathLst>
-                <a:path w="44283" h="0">
+                <a:path w="44283">
                   <a:moveTo>
                     <a:pt x="0" y="0"/>
                   </a:moveTo>
@@ -4260,7 +4314,9 @@
           <p:txBody>
             <a:bodyPr/>
             <a:lstStyle/>
-            <a:p/>
+            <a:p>
+              <a:endParaRPr/>
+            </a:p>
           </p:txBody>
         </p:sp>
         <p:sp>
@@ -4276,8 +4332,12 @@
             </a:xfrm>
             <a:custGeom>
               <a:avLst/>
+              <a:gdLst/>
+              <a:ahLst/>
+              <a:cxnLst/>
+              <a:rect l="0" t="0" r="0" b="0"/>
               <a:pathLst>
-                <a:path w="44283" h="0">
+                <a:path w="44283">
                   <a:moveTo>
                     <a:pt x="0" y="0"/>
                   </a:moveTo>
@@ -4300,7 +4360,9 @@
           <p:txBody>
             <a:bodyPr/>
             <a:lstStyle/>
-            <a:p/>
+            <a:p>
+              <a:endParaRPr/>
+            </a:p>
           </p:txBody>
         </p:sp>
         <p:sp>
@@ -4316,8 +4378,12 @@
             </a:xfrm>
             <a:custGeom>
               <a:avLst/>
+              <a:gdLst/>
+              <a:ahLst/>
+              <a:cxnLst/>
+              <a:rect l="0" t="0" r="0" b="0"/>
               <a:pathLst>
-                <a:path w="44283" h="0">
+                <a:path w="44283">
                   <a:moveTo>
                     <a:pt x="0" y="0"/>
                   </a:moveTo>
@@ -4340,7 +4406,9 @@
           <p:txBody>
             <a:bodyPr/>
             <a:lstStyle/>
-            <a:p/>
+            <a:p>
+              <a:endParaRPr/>
+            </a:p>
           </p:txBody>
         </p:sp>
         <p:sp>
@@ -4356,8 +4424,12 @@
             </a:xfrm>
             <a:custGeom>
               <a:avLst/>
+              <a:gdLst/>
+              <a:ahLst/>
+              <a:cxnLst/>
+              <a:rect l="0" t="0" r="0" b="0"/>
               <a:pathLst>
-                <a:path w="44283" h="0">
+                <a:path w="44283">
                   <a:moveTo>
                     <a:pt x="0" y="0"/>
                   </a:moveTo>
@@ -4380,7 +4452,9 @@
           <p:txBody>
             <a:bodyPr/>
             <a:lstStyle/>
-            <a:p/>
+            <a:p>
+              <a:endParaRPr/>
+            </a:p>
           </p:txBody>
         </p:sp>
         <p:sp>
@@ -4396,8 +4470,12 @@
             </a:xfrm>
             <a:custGeom>
               <a:avLst/>
+              <a:gdLst/>
+              <a:ahLst/>
+              <a:cxnLst/>
+              <a:rect l="0" t="0" r="0" b="0"/>
               <a:pathLst>
-                <a:path w="3617061" h="0">
+                <a:path w="3617061">
                   <a:moveTo>
                     <a:pt x="0" y="0"/>
                   </a:moveTo>
@@ -4420,7 +4498,9 @@
           <p:txBody>
             <a:bodyPr/>
             <a:lstStyle/>
-            <a:p/>
+            <a:p>
+              <a:endParaRPr/>
+            </a:p>
           </p:txBody>
         </p:sp>
         <p:sp>
@@ -4436,8 +4516,12 @@
             </a:xfrm>
             <a:custGeom>
               <a:avLst/>
+              <a:gdLst/>
+              <a:ahLst/>
+              <a:cxnLst/>
+              <a:rect l="0" t="0" r="0" b="0"/>
               <a:pathLst>
-                <a:path w="0" h="44283">
+                <a:path h="44283">
                   <a:moveTo>
                     <a:pt x="0" y="44283"/>
                   </a:moveTo>
@@ -4460,7 +4544,9 @@
           <p:txBody>
             <a:bodyPr/>
             <a:lstStyle/>
-            <a:p/>
+            <a:p>
+              <a:endParaRPr/>
+            </a:p>
           </p:txBody>
         </p:sp>
         <p:sp>
@@ -4476,8 +4562,12 @@
             </a:xfrm>
             <a:custGeom>
               <a:avLst/>
+              <a:gdLst/>
+              <a:ahLst/>
+              <a:cxnLst/>
+              <a:rect l="0" t="0" r="0" b="0"/>
               <a:pathLst>
-                <a:path w="0" h="44283">
+                <a:path h="44283">
                   <a:moveTo>
                     <a:pt x="0" y="44283"/>
                   </a:moveTo>
@@ -4500,7 +4590,9 @@
           <p:txBody>
             <a:bodyPr/>
             <a:lstStyle/>
-            <a:p/>
+            <a:p>
+              <a:endParaRPr/>
+            </a:p>
           </p:txBody>
         </p:sp>
         <p:sp>
@@ -4516,8 +4608,12 @@
             </a:xfrm>
             <a:custGeom>
               <a:avLst/>
+              <a:gdLst/>
+              <a:ahLst/>
+              <a:cxnLst/>
+              <a:rect l="0" t="0" r="0" b="0"/>
               <a:pathLst>
-                <a:path w="0" h="44283">
+                <a:path h="44283">
                   <a:moveTo>
                     <a:pt x="0" y="44283"/>
                   </a:moveTo>
@@ -4540,7 +4636,9 @@
           <p:txBody>
             <a:bodyPr/>
             <a:lstStyle/>
-            <a:p/>
+            <a:p>
+              <a:endParaRPr/>
+            </a:p>
           </p:txBody>
         </p:sp>
         <p:sp>
@@ -4556,8 +4654,12 @@
             </a:xfrm>
             <a:custGeom>
               <a:avLst/>
+              <a:gdLst/>
+              <a:ahLst/>
+              <a:cxnLst/>
+              <a:rect l="0" t="0" r="0" b="0"/>
               <a:pathLst>
-                <a:path w="0" h="44283">
+                <a:path h="44283">
                   <a:moveTo>
                     <a:pt x="0" y="44283"/>
                   </a:moveTo>
@@ -4580,7 +4682,9 @@
           <p:txBody>
             <a:bodyPr/>
             <a:lstStyle/>
-            <a:p/>
+            <a:p>
+              <a:endParaRPr/>
+            </a:p>
           </p:txBody>
         </p:sp>
         <p:sp>
@@ -4596,8 +4700,12 @@
             </a:xfrm>
             <a:custGeom>
               <a:avLst/>
+              <a:gdLst/>
+              <a:ahLst/>
+              <a:cxnLst/>
+              <a:rect l="0" t="0" r="0" b="0"/>
               <a:pathLst>
-                <a:path w="0" h="44283">
+                <a:path h="44283">
                   <a:moveTo>
                     <a:pt x="0" y="44283"/>
                   </a:moveTo>
@@ -4620,7 +4728,9 @@
           <p:txBody>
             <a:bodyPr/>
             <a:lstStyle/>
-            <a:p/>
+            <a:p>
+              <a:endParaRPr/>
+            </a:p>
           </p:txBody>
         </p:sp>
         <p:sp>
@@ -4636,8 +4746,12 @@
             </a:xfrm>
             <a:custGeom>
               <a:avLst/>
+              <a:gdLst/>
+              <a:ahLst/>
+              <a:cxnLst/>
+              <a:rect l="0" t="0" r="0" b="0"/>
               <a:pathLst>
-                <a:path w="0" h="44283">
+                <a:path h="44283">
                   <a:moveTo>
                     <a:pt x="0" y="44283"/>
                   </a:moveTo>
@@ -4660,7 +4774,9 @@
           <p:txBody>
             <a:bodyPr/>
             <a:lstStyle/>
-            <a:p/>
+            <a:p>
+              <a:endParaRPr/>
+            </a:p>
           </p:txBody>
         </p:sp>
         <p:sp>
@@ -4680,10 +4796,10 @@
             <a:noFill/>
           </p:spPr>
           <p:txBody>
-            <a:bodyPr lIns="0" rIns="0" tIns="0" bIns="0" anchorCtr="1" anchor="ctr" wrap="none"/>
-            <a:lstStyle/>
-            <a:p>
-              <a:pPr algn="l" marL="0" marR="0" indent="0">
+            <a:bodyPr wrap="none" lIns="0" tIns="0" rIns="0" bIns="0" anchor="ctr" anchorCtr="1"/>
+            <a:lstStyle/>
+            <a:p>
+              <a:pPr marL="0" marR="0" indent="0" algn="l">
                 <a:lnSpc>
                   <a:spcPts val="1200"/>
                 </a:lnSpc>
@@ -4726,10 +4842,10 @@
             <a:noFill/>
           </p:spPr>
           <p:txBody>
-            <a:bodyPr lIns="0" rIns="0" tIns="0" bIns="0" anchorCtr="1" anchor="ctr" wrap="none"/>
-            <a:lstStyle/>
-            <a:p>
-              <a:pPr algn="l" marL="0" marR="0" indent="0">
+            <a:bodyPr wrap="none" lIns="0" tIns="0" rIns="0" bIns="0" anchor="ctr" anchorCtr="1"/>
+            <a:lstStyle/>
+            <a:p>
+              <a:pPr marL="0" marR="0" indent="0" algn="l">
                 <a:lnSpc>
                   <a:spcPts val="1200"/>
                 </a:lnSpc>
@@ -4772,10 +4888,10 @@
             <a:noFill/>
           </p:spPr>
           <p:txBody>
-            <a:bodyPr lIns="0" rIns="0" tIns="0" bIns="0" anchorCtr="1" anchor="ctr" wrap="none"/>
-            <a:lstStyle/>
-            <a:p>
-              <a:pPr algn="l" marL="0" marR="0" indent="0">
+            <a:bodyPr wrap="none" lIns="0" tIns="0" rIns="0" bIns="0" anchor="ctr" anchorCtr="1"/>
+            <a:lstStyle/>
+            <a:p>
+              <a:pPr marL="0" marR="0" indent="0" algn="l">
                 <a:lnSpc>
                   <a:spcPts val="1200"/>
                 </a:lnSpc>
@@ -4818,10 +4934,10 @@
             <a:noFill/>
           </p:spPr>
           <p:txBody>
-            <a:bodyPr lIns="0" rIns="0" tIns="0" bIns="0" anchorCtr="1" anchor="ctr" wrap="none"/>
-            <a:lstStyle/>
-            <a:p>
-              <a:pPr algn="l" marL="0" marR="0" indent="0">
+            <a:bodyPr wrap="none" lIns="0" tIns="0" rIns="0" bIns="0" anchor="ctr" anchorCtr="1"/>
+            <a:lstStyle/>
+            <a:p>
+              <a:pPr marL="0" marR="0" indent="0" algn="l">
                 <a:lnSpc>
                   <a:spcPts val="1200"/>
                 </a:lnSpc>
@@ -4864,10 +4980,10 @@
             <a:noFill/>
           </p:spPr>
           <p:txBody>
-            <a:bodyPr lIns="0" rIns="0" tIns="0" bIns="0" anchorCtr="1" anchor="ctr" wrap="none"/>
-            <a:lstStyle/>
-            <a:p>
-              <a:pPr algn="l" marL="0" marR="0" indent="0">
+            <a:bodyPr wrap="none" lIns="0" tIns="0" rIns="0" bIns="0" anchor="ctr" anchorCtr="1"/>
+            <a:lstStyle/>
+            <a:p>
+              <a:pPr marL="0" marR="0" indent="0" algn="l">
                 <a:lnSpc>
                   <a:spcPts val="1200"/>
                 </a:lnSpc>
@@ -4910,10 +5026,10 @@
             <a:noFill/>
           </p:spPr>
           <p:txBody>
-            <a:bodyPr lIns="0" rIns="0" tIns="0" bIns="0" anchorCtr="1" anchor="ctr" wrap="none"/>
-            <a:lstStyle/>
-            <a:p>
-              <a:pPr algn="l" marL="0" marR="0" indent="0">
+            <a:bodyPr wrap="none" lIns="0" tIns="0" rIns="0" bIns="0" anchor="ctr" anchorCtr="1"/>
+            <a:lstStyle/>
+            <a:p>
+              <a:pPr marL="0" marR="0" indent="0" algn="l">
                 <a:lnSpc>
                   <a:spcPts val="1200"/>
                 </a:lnSpc>
@@ -4956,10 +5072,10 @@
             <a:noFill/>
           </p:spPr>
           <p:txBody>
-            <a:bodyPr lIns="0" rIns="0" tIns="0" bIns="0" anchorCtr="1" anchor="ctr" wrap="none"/>
-            <a:lstStyle/>
-            <a:p>
-              <a:pPr algn="l" marL="0" marR="0" indent="0">
+            <a:bodyPr wrap="none" lIns="0" tIns="0" rIns="0" bIns="0" anchor="ctr" anchorCtr="1"/>
+            <a:lstStyle/>
+            <a:p>
+              <a:pPr marL="0" marR="0" indent="0" algn="l">
                 <a:lnSpc>
                   <a:spcPts val="1400"/>
                 </a:lnSpc>
@@ -5002,10 +5118,10 @@
             <a:noFill/>
           </p:spPr>
           <p:txBody>
-            <a:bodyPr lIns="0" rIns="0" tIns="0" bIns="0" anchorCtr="1" anchor="ctr" wrap="none"/>
-            <a:lstStyle/>
-            <a:p>
-              <a:pPr algn="l" marL="0" marR="0" indent="0">
+            <a:bodyPr wrap="none" lIns="0" tIns="0" rIns="0" bIns="0" anchor="ctr" anchorCtr="1"/>
+            <a:lstStyle/>
+            <a:p>
+              <a:pPr marL="0" marR="0" indent="0" algn="l">
                 <a:lnSpc>
                   <a:spcPts val="1400"/>
                 </a:lnSpc>
@@ -5039,7 +5155,7 @@
           </p:nvSpPr>
           <p:spPr>
             <a:xfrm>
-              <a:off x="6494348" y="2472905"/>
+              <a:off x="6494348" y="2252324"/>
               <a:ext cx="1966565" cy="170333"/>
             </a:xfrm>
             <a:prstGeom prst="rect">
@@ -5048,10 +5164,10 @@
             <a:noFill/>
           </p:spPr>
           <p:txBody>
-            <a:bodyPr lIns="0" rIns="0" tIns="0" bIns="0" anchorCtr="1" anchor="ctr" wrap="none"/>
-            <a:lstStyle/>
-            <a:p>
-              <a:pPr algn="l" marL="0" marR="0" indent="0">
+            <a:bodyPr wrap="none" lIns="0" tIns="0" rIns="0" bIns="0" anchor="ctr" anchorCtr="1"/>
+            <a:lstStyle/>
+            <a:p>
+              <a:pPr marL="0" marR="0" indent="0" algn="l">
                 <a:lnSpc>
                   <a:spcPts val="1400"/>
                 </a:lnSpc>
@@ -5085,7 +5201,7 @@
           </p:nvSpPr>
           <p:spPr>
             <a:xfrm>
-              <a:off x="6566947" y="2824070"/>
+              <a:off x="6566947" y="2603488"/>
               <a:ext cx="49651" cy="49651"/>
             </a:xfrm>
             <a:prstGeom prst="ellipse">
@@ -5109,7 +5225,9 @@
           <p:txBody>
             <a:bodyPr/>
             <a:lstStyle/>
-            <a:p/>
+            <a:p>
+              <a:endParaRPr/>
+            </a:p>
           </p:txBody>
         </p:sp>
         <p:sp>
@@ -5120,7 +5238,7 @@
           </p:nvSpPr>
           <p:spPr>
             <a:xfrm>
-              <a:off x="6566947" y="3018919"/>
+              <a:off x="6566947" y="2798338"/>
               <a:ext cx="49651" cy="49651"/>
             </a:xfrm>
             <a:prstGeom prst="ellipse">
@@ -5144,7 +5262,9 @@
           <p:txBody>
             <a:bodyPr/>
             <a:lstStyle/>
-            <a:p/>
+            <a:p>
+              <a:endParaRPr/>
+            </a:p>
           </p:txBody>
         </p:sp>
         <p:sp>
@@ -5155,7 +5275,7 @@
           </p:nvSpPr>
           <p:spPr>
             <a:xfrm>
-              <a:off x="6566947" y="3213768"/>
+              <a:off x="6566947" y="2993187"/>
               <a:ext cx="49651" cy="49651"/>
             </a:xfrm>
             <a:prstGeom prst="ellipse">
@@ -5179,7 +5299,9 @@
           <p:txBody>
             <a:bodyPr/>
             <a:lstStyle/>
-            <a:p/>
+            <a:p>
+              <a:endParaRPr/>
+            </a:p>
           </p:txBody>
         </p:sp>
         <p:sp>
@@ -5190,7 +5312,7 @@
           </p:nvSpPr>
           <p:spPr>
             <a:xfrm>
-              <a:off x="6566947" y="3408618"/>
+              <a:off x="6566947" y="3188036"/>
               <a:ext cx="49651" cy="49651"/>
             </a:xfrm>
             <a:prstGeom prst="ellipse">
@@ -5214,7 +5336,9 @@
           <p:txBody>
             <a:bodyPr/>
             <a:lstStyle/>
-            <a:p/>
+            <a:p>
+              <a:endParaRPr/>
+            </a:p>
           </p:txBody>
         </p:sp>
         <p:sp>
@@ -5225,7 +5349,7 @@
           </p:nvSpPr>
           <p:spPr>
             <a:xfrm>
-              <a:off x="6566947" y="3603467"/>
+              <a:off x="6566947" y="3382886"/>
               <a:ext cx="49651" cy="49651"/>
             </a:xfrm>
             <a:prstGeom prst="ellipse">
@@ -5249,7 +5373,9 @@
           <p:txBody>
             <a:bodyPr/>
             <a:lstStyle/>
-            <a:p/>
+            <a:p>
+              <a:endParaRPr/>
+            </a:p>
           </p:txBody>
         </p:sp>
         <p:sp>
@@ -5260,7 +5386,7 @@
           </p:nvSpPr>
           <p:spPr>
             <a:xfrm>
-              <a:off x="6777765" y="3084636"/>
+              <a:off x="6777765" y="2864054"/>
               <a:ext cx="50750" cy="13766"/>
             </a:xfrm>
             <a:prstGeom prst="rect">
@@ -5269,10 +5395,10 @@
             <a:noFill/>
           </p:spPr>
           <p:txBody>
-            <a:bodyPr lIns="0" rIns="0" tIns="0" bIns="0" anchorCtr="1" anchor="ctr" wrap="none"/>
-            <a:lstStyle/>
-            <a:p>
-              <a:pPr algn="l" marL="0" marR="0" indent="0">
+            <a:bodyPr wrap="none" lIns="0" tIns="0" rIns="0" bIns="0" anchor="ctr" anchorCtr="1"/>
+            <a:lstStyle/>
+            <a:p>
+              <a:pPr marL="0" marR="0" indent="0" algn="l">
                 <a:lnSpc>
                   <a:spcPts val="1200"/>
                 </a:lnSpc>
@@ -5306,7 +5432,7 @@
           </p:nvSpPr>
           <p:spPr>
             <a:xfrm>
-              <a:off x="6777765" y="3183937"/>
+              <a:off x="6777765" y="2963356"/>
               <a:ext cx="330398" cy="109314"/>
             </a:xfrm>
             <a:prstGeom prst="rect">
@@ -5315,10 +5441,10 @@
             <a:noFill/>
           </p:spPr>
           <p:txBody>
-            <a:bodyPr lIns="0" rIns="0" tIns="0" bIns="0" anchorCtr="1" anchor="ctr" wrap="none"/>
-            <a:lstStyle/>
-            <a:p>
-              <a:pPr algn="l" marL="0" marR="0" indent="0">
+            <a:bodyPr wrap="none" lIns="0" tIns="0" rIns="0" bIns="0" anchor="ctr" anchorCtr="1"/>
+            <a:lstStyle/>
+            <a:p>
+              <a:pPr marL="0" marR="0" indent="0" algn="l">
                 <a:lnSpc>
                   <a:spcPts val="1200"/>
                 </a:lnSpc>
@@ -5352,7 +5478,7 @@
           </p:nvSpPr>
           <p:spPr>
             <a:xfrm>
-              <a:off x="6777765" y="3378786"/>
+              <a:off x="6777765" y="3158205"/>
               <a:ext cx="330398" cy="109314"/>
             </a:xfrm>
             <a:prstGeom prst="rect">
@@ -5361,10 +5487,10 @@
             <a:noFill/>
           </p:spPr>
           <p:txBody>
-            <a:bodyPr lIns="0" rIns="0" tIns="0" bIns="0" anchorCtr="1" anchor="ctr" wrap="none"/>
-            <a:lstStyle/>
-            <a:p>
-              <a:pPr algn="l" marL="0" marR="0" indent="0">
+            <a:bodyPr wrap="none" lIns="0" tIns="0" rIns="0" bIns="0" anchor="ctr" anchorCtr="1"/>
+            <a:lstStyle/>
+            <a:p>
+              <a:pPr marL="0" marR="0" indent="0" algn="l">
                 <a:lnSpc>
                   <a:spcPts val="1200"/>
                 </a:lnSpc>
@@ -5398,7 +5524,7 @@
           </p:nvSpPr>
           <p:spPr>
             <a:xfrm>
-              <a:off x="6777765" y="3567459"/>
+              <a:off x="6777765" y="3346878"/>
               <a:ext cx="211708" cy="115490"/>
             </a:xfrm>
             <a:prstGeom prst="rect">
@@ -5407,10 +5533,10 @@
             <a:noFill/>
           </p:spPr>
           <p:txBody>
-            <a:bodyPr lIns="0" rIns="0" tIns="0" bIns="0" anchorCtr="1" anchor="ctr" wrap="none"/>
-            <a:lstStyle/>
-            <a:p>
-              <a:pPr algn="l" marL="0" marR="0" indent="0">
+            <a:bodyPr wrap="none" lIns="0" tIns="0" rIns="0" bIns="0" anchor="ctr" anchorCtr="1"/>
+            <a:lstStyle/>
+            <a:p>
+              <a:pPr marL="0" marR="0" indent="0" algn="l">
                 <a:lnSpc>
                   <a:spcPts val="1200"/>
                 </a:lnSpc>
@@ -5444,7 +5570,7 @@
           </p:nvSpPr>
           <p:spPr>
             <a:xfrm>
-              <a:off x="6494348" y="3882755"/>
+              <a:off x="6494348" y="3662174"/>
               <a:ext cx="1205532" cy="167295"/>
             </a:xfrm>
             <a:prstGeom prst="rect">
@@ -5453,10 +5579,10 @@
             <a:noFill/>
           </p:spPr>
           <p:txBody>
-            <a:bodyPr lIns="0" rIns="0" tIns="0" bIns="0" anchorCtr="1" anchor="ctr" wrap="none"/>
-            <a:lstStyle/>
-            <a:p>
-              <a:pPr algn="l" marL="0" marR="0" indent="0">
+            <a:bodyPr wrap="none" lIns="0" tIns="0" rIns="0" bIns="0" anchor="ctr" anchorCtr="1"/>
+            <a:lstStyle/>
+            <a:p>
+              <a:pPr marL="0" marR="0" indent="0" algn="l">
                 <a:lnSpc>
                   <a:spcPts val="1400"/>
                 </a:lnSpc>
@@ -5490,8 +5616,8 @@
           </p:nvSpPr>
           <p:spPr>
             <a:xfrm>
-              <a:off x="6576563" y="4178798"/>
-              <a:ext cx="161368" cy="161368"/>
+              <a:off x="6651976" y="4017075"/>
+              <a:ext cx="36101" cy="36101"/>
             </a:xfrm>
             <a:prstGeom prst="ellipse">
               <a:avLst/>
@@ -5514,7 +5640,9 @@
           <p:txBody>
             <a:bodyPr/>
             <a:lstStyle/>
-            <a:p/>
+            <a:p>
+              <a:endParaRPr/>
+            </a:p>
           </p:txBody>
         </p:sp>
         <p:sp>
@@ -5525,8 +5653,8 @@
           </p:nvSpPr>
           <p:spPr>
             <a:xfrm>
-              <a:off x="6550253" y="4389836"/>
-              <a:ext cx="213987" cy="213987"/>
+              <a:off x="6623998" y="4183946"/>
+              <a:ext cx="92058" cy="92058"/>
             </a:xfrm>
             <a:prstGeom prst="ellipse">
               <a:avLst/>
@@ -5549,7 +5677,9 @@
           <p:txBody>
             <a:bodyPr/>
             <a:lstStyle/>
-            <a:p/>
+            <a:p>
+              <a:endParaRPr/>
+            </a:p>
           </p:txBody>
         </p:sp>
         <p:sp>
@@ -5560,8 +5690,8 @@
           </p:nvSpPr>
           <p:spPr>
             <a:xfrm>
-              <a:off x="6530115" y="4668745"/>
-              <a:ext cx="254264" cy="254264"/>
+              <a:off x="6583443" y="4349852"/>
+              <a:ext cx="173167" cy="173167"/>
             </a:xfrm>
             <a:prstGeom prst="ellipse">
               <a:avLst/>
@@ -5584,19 +5714,95 @@
           <p:txBody>
             <a:bodyPr/>
             <a:lstStyle/>
-            <a:p/>
-          </p:txBody>
-        </p:sp>
-        <p:sp>
-          <p:nvSpPr>
-            <p:cNvPr id="63" name="tx63"/>
-            <p:cNvSpPr/>
-            <p:nvPr/>
-          </p:nvSpPr>
-          <p:spPr>
-            <a:xfrm>
-              <a:off x="6908714" y="4204527"/>
-              <a:ext cx="211856" cy="109611"/>
+            <a:p>
+              <a:endParaRPr/>
+            </a:p>
+          </p:txBody>
+        </p:sp>
+        <p:sp>
+          <p:nvSpPr>
+            <p:cNvPr id="63" name="pt63"/>
+            <p:cNvSpPr/>
+            <p:nvPr/>
+          </p:nvSpPr>
+          <p:spPr>
+            <a:xfrm>
+              <a:off x="6559182" y="4575891"/>
+              <a:ext cx="221689" cy="221689"/>
+            </a:xfrm>
+            <a:prstGeom prst="ellipse">
+              <a:avLst/>
+            </a:prstGeom>
+            <a:solidFill>
+              <a:srgbClr val="000000">
+                <a:alpha val="100000"/>
+              </a:srgbClr>
+            </a:solidFill>
+            <a:ln w="9000" cap="rnd">
+              <a:solidFill>
+                <a:srgbClr val="000000">
+                  <a:alpha val="100000"/>
+                </a:srgbClr>
+              </a:solidFill>
+              <a:prstDash val="solid"/>
+              <a:round/>
+            </a:ln>
+          </p:spPr>
+          <p:txBody>
+            <a:bodyPr/>
+            <a:lstStyle/>
+            <a:p>
+              <a:endParaRPr/>
+            </a:p>
+          </p:txBody>
+        </p:sp>
+        <p:sp>
+          <p:nvSpPr>
+            <p:cNvPr id="64" name="pt64"/>
+            <p:cNvSpPr/>
+            <p:nvPr/>
+          </p:nvSpPr>
+          <p:spPr>
+            <a:xfrm>
+              <a:off x="6533274" y="4866925"/>
+              <a:ext cx="273507" cy="273507"/>
+            </a:xfrm>
+            <a:prstGeom prst="ellipse">
+              <a:avLst/>
+            </a:prstGeom>
+            <a:solidFill>
+              <a:srgbClr val="000000">
+                <a:alpha val="100000"/>
+              </a:srgbClr>
+            </a:solidFill>
+            <a:ln w="9000" cap="rnd">
+              <a:solidFill>
+                <a:srgbClr val="000000">
+                  <a:alpha val="100000"/>
+                </a:srgbClr>
+              </a:solidFill>
+              <a:prstDash val="solid"/>
+              <a:round/>
+            </a:ln>
+          </p:spPr>
+          <p:txBody>
+            <a:bodyPr/>
+            <a:lstStyle/>
+            <a:p>
+              <a:endParaRPr/>
+            </a:p>
+          </p:txBody>
+        </p:sp>
+        <p:sp>
+          <p:nvSpPr>
+            <p:cNvPr id="65" name="tx65"/>
+            <p:cNvSpPr/>
+            <p:nvPr/>
+          </p:nvSpPr>
+          <p:spPr>
+            <a:xfrm>
+              <a:off x="6934274" y="3982850"/>
+              <a:ext cx="84757" cy="106933"/>
             </a:xfrm>
             <a:prstGeom prst="rect">
               <a:avLst/>
@@ -5604,10 +5810,10 @@
             <a:noFill/>
           </p:spPr>
           <p:txBody>
-            <a:bodyPr lIns="0" rIns="0" tIns="0" bIns="0" anchorCtr="1" anchor="ctr" wrap="none"/>
-            <a:lstStyle/>
-            <a:p>
-              <a:pPr algn="l" marL="0" marR="0" indent="0">
+            <a:bodyPr wrap="none" lIns="0" tIns="0" rIns="0" bIns="0" anchor="ctr" anchorCtr="1"/>
+            <a:lstStyle/>
+            <a:p>
+              <a:pPr marL="0" marR="0" indent="0" algn="l">
                 <a:lnSpc>
                   <a:spcPts val="1200"/>
                 </a:lnSpc>
@@ -5628,21 +5834,21 @@
                   <a:latin typeface="Helvetica"/>
                   <a:cs typeface="Helvetica"/>
                 </a:rPr>
-                <a:t>2.5</a:t>
+                <a:t>2</a:t>
               </a:r>
             </a:p>
           </p:txBody>
         </p:sp>
         <p:sp>
           <p:nvSpPr>
-            <p:cNvPr id="64" name="tx64"/>
-            <p:cNvSpPr/>
-            <p:nvPr/>
-          </p:nvSpPr>
-          <p:spPr>
-            <a:xfrm>
-              <a:off x="6908714" y="4441875"/>
-              <a:ext cx="211856" cy="109611"/>
+            <p:cNvPr id="66" name="tx66"/>
+            <p:cNvSpPr/>
+            <p:nvPr/>
+          </p:nvSpPr>
+          <p:spPr>
+            <a:xfrm>
+              <a:off x="6934274" y="4177699"/>
+              <a:ext cx="211856" cy="106933"/>
             </a:xfrm>
             <a:prstGeom prst="rect">
               <a:avLst/>
@@ -5650,10 +5856,10 @@
             <a:noFill/>
           </p:spPr>
           <p:txBody>
-            <a:bodyPr lIns="0" rIns="0" tIns="0" bIns="0" anchorCtr="1" anchor="ctr" wrap="none"/>
-            <a:lstStyle/>
-            <a:p>
-              <a:pPr algn="l" marL="0" marR="0" indent="0">
+            <a:bodyPr wrap="none" lIns="0" tIns="0" rIns="0" bIns="0" anchor="ctr" anchorCtr="1"/>
+            <a:lstStyle/>
+            <a:p>
+              <a:pPr marL="0" marR="0" indent="0" algn="l">
                 <a:lnSpc>
                   <a:spcPts val="1200"/>
                 </a:lnSpc>
@@ -5674,21 +5880,21 @@
                   <a:latin typeface="Helvetica"/>
                   <a:cs typeface="Helvetica"/>
                 </a:rPr>
-                <a:t>3.0</a:t>
+                <a:t>2.1</a:t>
               </a:r>
             </a:p>
           </p:txBody>
         </p:sp>
         <p:sp>
           <p:nvSpPr>
-            <p:cNvPr id="65" name="tx65"/>
-            <p:cNvSpPr/>
-            <p:nvPr/>
-          </p:nvSpPr>
-          <p:spPr>
-            <a:xfrm>
-              <a:off x="6908714" y="4740922"/>
-              <a:ext cx="211856" cy="109611"/>
+            <p:cNvPr id="67" name="tx67"/>
+            <p:cNvSpPr/>
+            <p:nvPr/>
+          </p:nvSpPr>
+          <p:spPr>
+            <a:xfrm>
+              <a:off x="6934274" y="4381332"/>
+              <a:ext cx="211856" cy="109760"/>
             </a:xfrm>
             <a:prstGeom prst="rect">
               <a:avLst/>
@@ -5696,10 +5902,10 @@
             <a:noFill/>
           </p:spPr>
           <p:txBody>
-            <a:bodyPr lIns="0" rIns="0" tIns="0" bIns="0" anchorCtr="1" anchor="ctr" wrap="none"/>
-            <a:lstStyle/>
-            <a:p>
-              <a:pPr algn="l" marL="0" marR="0" indent="0">
+            <a:bodyPr wrap="none" lIns="0" tIns="0" rIns="0" bIns="0" anchor="ctr" anchorCtr="1"/>
+            <a:lstStyle/>
+            <a:p>
+              <a:pPr marL="0" marR="0" indent="0" algn="l">
                 <a:lnSpc>
                   <a:spcPts val="1200"/>
                 </a:lnSpc>
@@ -5720,14 +5926,106 @@
                   <a:latin typeface="Helvetica"/>
                   <a:cs typeface="Helvetica"/>
                 </a:rPr>
-                <a:t>3.5</a:t>
+                <a:t>2.6</a:t>
               </a:r>
             </a:p>
           </p:txBody>
         </p:sp>
         <p:sp>
           <p:nvSpPr>
-            <p:cNvPr id="66" name="tx66"/>
+            <p:cNvPr id="68" name="tx68"/>
+            <p:cNvSpPr/>
+            <p:nvPr/>
+          </p:nvSpPr>
+          <p:spPr>
+            <a:xfrm>
+              <a:off x="6934274" y="4631781"/>
+              <a:ext cx="211856" cy="109611"/>
+            </a:xfrm>
+            <a:prstGeom prst="rect">
+              <a:avLst/>
+            </a:prstGeom>
+            <a:noFill/>
+          </p:spPr>
+          <p:txBody>
+            <a:bodyPr wrap="none" lIns="0" tIns="0" rIns="0" bIns="0" anchor="ctr" anchorCtr="1"/>
+            <a:lstStyle/>
+            <a:p>
+              <a:pPr marL="0" marR="0" indent="0" algn="l">
+                <a:lnSpc>
+                  <a:spcPts val="1200"/>
+                </a:lnSpc>
+                <a:spcBef>
+                  <a:spcPts val="0"/>
+                </a:spcBef>
+                <a:spcAft>
+                  <a:spcPts val="0"/>
+                </a:spcAft>
+              </a:pPr>
+              <a:r>
+                <a:rPr sz="1200">
+                  <a:solidFill>
+                    <a:srgbClr val="000000">
+                      <a:alpha val="100000"/>
+                    </a:srgbClr>
+                  </a:solidFill>
+                  <a:latin typeface="Helvetica"/>
+                  <a:cs typeface="Helvetica"/>
+                </a:rPr>
+                <a:t>3.1</a:t>
+              </a:r>
+            </a:p>
+          </p:txBody>
+        </p:sp>
+        <p:sp>
+          <p:nvSpPr>
+            <p:cNvPr id="69" name="tx69"/>
+            <p:cNvSpPr/>
+            <p:nvPr/>
+          </p:nvSpPr>
+          <p:spPr>
+            <a:xfrm>
+              <a:off x="6934274" y="4948426"/>
+              <a:ext cx="211856" cy="109909"/>
+            </a:xfrm>
+            <a:prstGeom prst="rect">
+              <a:avLst/>
+            </a:prstGeom>
+            <a:noFill/>
+          </p:spPr>
+          <p:txBody>
+            <a:bodyPr wrap="none" lIns="0" tIns="0" rIns="0" bIns="0" anchor="ctr" anchorCtr="1"/>
+            <a:lstStyle/>
+            <a:p>
+              <a:pPr marL="0" marR="0" indent="0" algn="l">
+                <a:lnSpc>
+                  <a:spcPts val="1200"/>
+                </a:lnSpc>
+                <a:spcBef>
+                  <a:spcPts val="0"/>
+                </a:spcBef>
+                <a:spcAft>
+                  <a:spcPts val="0"/>
+                </a:spcAft>
+              </a:pPr>
+              <a:r>
+                <a:rPr sz="1200">
+                  <a:solidFill>
+                    <a:srgbClr val="000000">
+                      <a:alpha val="100000"/>
+                    </a:srgbClr>
+                  </a:solidFill>
+                  <a:latin typeface="Helvetica"/>
+                  <a:cs typeface="Helvetica"/>
+                </a:rPr>
+                <a:t>3.8</a:t>
+              </a:r>
+            </a:p>
+          </p:txBody>
+        </p:sp>
+        <p:sp>
+          <p:nvSpPr>
+            <p:cNvPr id="70" name="tx70"/>
             <p:cNvSpPr/>
             <p:nvPr/>
           </p:nvSpPr>
@@ -5742,10 +6040,10 @@
             <a:noFill/>
           </p:spPr>
           <p:txBody>
-            <a:bodyPr lIns="0" rIns="0" tIns="0" bIns="0" anchorCtr="1" anchor="ctr" wrap="none"/>
-            <a:lstStyle/>
-            <a:p>
-              <a:pPr algn="l" marL="0" marR="0" indent="0">
+            <a:bodyPr wrap="none" lIns="0" tIns="0" rIns="0" bIns="0" anchor="ctr" anchorCtr="1"/>
+            <a:lstStyle/>
+            <a:p>
+              <a:pPr marL="0" marR="0" indent="0" algn="l">
                 <a:lnSpc>
                   <a:spcPts val="1600"/>
                 </a:lnSpc>
@@ -5773,7 +6071,7 @@
         </p:sp>
         <p:sp>
           <p:nvSpPr>
-            <p:cNvPr id="67" name="tx67"/>
+            <p:cNvPr id="71" name="tx71"/>
             <p:cNvSpPr/>
             <p:nvPr/>
           </p:nvSpPr>
@@ -5788,10 +6086,10 @@
             <a:noFill/>
           </p:spPr>
           <p:txBody>
-            <a:bodyPr lIns="0" rIns="0" tIns="0" bIns="0" anchorCtr="1" anchor="ctr" wrap="none"/>
-            <a:lstStyle/>
-            <a:p>
-              <a:pPr algn="l" marL="0" marR="0" indent="0">
+            <a:bodyPr wrap="none" lIns="0" tIns="0" rIns="0" bIns="0" anchor="ctr" anchorCtr="1"/>
+            <a:lstStyle/>
+            <a:p>
+              <a:pPr marL="0" marR="0" indent="0" algn="l">
                 <a:lnSpc>
                   <a:spcPts val="1600"/>
                 </a:lnSpc>
@@ -5819,7 +6117,7 @@
         </p:sp>
         <p:sp>
           <p:nvSpPr>
-            <p:cNvPr id="68" name="tx68"/>
+            <p:cNvPr id="72" name="tx72"/>
             <p:cNvSpPr/>
             <p:nvPr/>
           </p:nvSpPr>
@@ -5834,10 +6132,10 @@
             <a:noFill/>
           </p:spPr>
           <p:txBody>
-            <a:bodyPr lIns="0" rIns="0" tIns="0" bIns="0" anchorCtr="1" anchor="ctr" wrap="none"/>
-            <a:lstStyle/>
-            <a:p>
-              <a:pPr algn="l" marL="0" marR="0" indent="0">
+            <a:bodyPr wrap="none" lIns="0" tIns="0" rIns="0" bIns="0" anchor="ctr" anchorCtr="1"/>
+            <a:lstStyle/>
+            <a:p>
+              <a:pPr marL="0" marR="0" indent="0" algn="l">
                 <a:lnSpc>
                   <a:spcPts val="1600"/>
                 </a:lnSpc>
@@ -5865,7 +6163,7 @@
         </p:sp>
         <p:sp>
           <p:nvSpPr>
-            <p:cNvPr id="69" name="tx69"/>
+            <p:cNvPr id="73" name="tx73"/>
             <p:cNvSpPr/>
             <p:nvPr/>
           </p:nvSpPr>
@@ -5880,10 +6178,10 @@
             <a:noFill/>
           </p:spPr>
           <p:txBody>
-            <a:bodyPr lIns="0" rIns="0" tIns="0" bIns="0" anchorCtr="1" anchor="ctr" wrap="none"/>
-            <a:lstStyle/>
-            <a:p>
-              <a:pPr algn="l" marL="0" marR="0" indent="0">
+            <a:bodyPr wrap="none" lIns="0" tIns="0" rIns="0" bIns="0" anchor="ctr" anchorCtr="1"/>
+            <a:lstStyle/>
+            <a:p>
+              <a:pPr marL="0" marR="0" indent="0" algn="l">
                 <a:lnSpc>
                   <a:spcPts val="1600"/>
                 </a:lnSpc>
@@ -5911,7 +6209,7 @@
         </p:sp>
         <p:sp>
           <p:nvSpPr>
-            <p:cNvPr id="70" name="tx70"/>
+            <p:cNvPr id="74" name="tx74"/>
             <p:cNvSpPr/>
             <p:nvPr/>
           </p:nvSpPr>
@@ -5926,10 +6224,10 @@
             <a:noFill/>
           </p:spPr>
           <p:txBody>
-            <a:bodyPr lIns="0" rIns="0" tIns="0" bIns="0" anchorCtr="1" anchor="ctr" wrap="none"/>
-            <a:lstStyle/>
-            <a:p>
-              <a:pPr algn="l" marL="0" marR="0" indent="0">
+            <a:bodyPr wrap="none" lIns="0" tIns="0" rIns="0" bIns="0" anchor="ctr" anchorCtr="1"/>
+            <a:lstStyle/>
+            <a:p>
+              <a:pPr marL="0" marR="0" indent="0" algn="l">
                 <a:lnSpc>
                   <a:spcPts val="1600"/>
                 </a:lnSpc>
@@ -5957,7 +6255,7 @@
         </p:sp>
         <p:sp>
           <p:nvSpPr>
-            <p:cNvPr id="71" name="tx71"/>
+            <p:cNvPr id="75" name="tx75"/>
             <p:cNvSpPr/>
             <p:nvPr/>
           </p:nvSpPr>
@@ -5972,10 +6270,10 @@
             <a:noFill/>
           </p:spPr>
           <p:txBody>
-            <a:bodyPr lIns="0" rIns="0" tIns="0" bIns="0" anchorCtr="1" anchor="ctr" wrap="none"/>
-            <a:lstStyle/>
-            <a:p>
-              <a:pPr algn="l" marL="0" marR="0" indent="0">
+            <a:bodyPr wrap="none" lIns="0" tIns="0" rIns="0" bIns="0" anchor="ctr" anchorCtr="1"/>
+            <a:lstStyle/>
+            <a:p>
+              <a:pPr marL="0" marR="0" indent="0" algn="l">
                 <a:lnSpc>
                   <a:spcPts val="1600"/>
                 </a:lnSpc>
@@ -6003,7 +6301,7 @@
         </p:sp>
         <p:sp>
           <p:nvSpPr>
-            <p:cNvPr id="72" name="tx72"/>
+            <p:cNvPr id="76" name="tx76"/>
             <p:cNvSpPr/>
             <p:nvPr/>
           </p:nvSpPr>
@@ -6018,10 +6316,10 @@
             <a:noFill/>
           </p:spPr>
           <p:txBody>
-            <a:bodyPr lIns="0" rIns="0" tIns="0" bIns="0" anchorCtr="1" anchor="ctr" wrap="none"/>
-            <a:lstStyle/>
-            <a:p>
-              <a:pPr algn="l" marL="0" marR="0" indent="0">
+            <a:bodyPr wrap="none" lIns="0" tIns="0" rIns="0" bIns="0" anchor="ctr" anchorCtr="1"/>
+            <a:lstStyle/>
+            <a:p>
+              <a:pPr marL="0" marR="0" indent="0" algn="l">
                 <a:lnSpc>
                   <a:spcPts val="1600"/>
                 </a:lnSpc>
@@ -6049,7 +6347,7 @@
         </p:sp>
         <p:sp>
           <p:nvSpPr>
-            <p:cNvPr id="73" name="tx73"/>
+            <p:cNvPr id="77" name="tx77"/>
             <p:cNvSpPr/>
             <p:nvPr/>
           </p:nvSpPr>
@@ -6064,10 +6362,10 @@
             <a:noFill/>
           </p:spPr>
           <p:txBody>
-            <a:bodyPr lIns="0" rIns="0" tIns="0" bIns="0" anchorCtr="1" anchor="ctr" wrap="none"/>
-            <a:lstStyle/>
-            <a:p>
-              <a:pPr algn="l" marL="0" marR="0" indent="0">
+            <a:bodyPr wrap="none" lIns="0" tIns="0" rIns="0" bIns="0" anchor="ctr" anchorCtr="1"/>
+            <a:lstStyle/>
+            <a:p>
+              <a:pPr marL="0" marR="0" indent="0" algn="l">
                 <a:lnSpc>
                   <a:spcPts val="1600"/>
                 </a:lnSpc>

</xml_diff>